<commit_message>
Change <Installation of Wireshark.pptx> : Signed by Member2
</commit_message>
<xml_diff>
--- a/Installation of Wireshark.pptx
+++ b/Installation of Wireshark.pptx
@@ -114,6 +114,11 @@
       </a:defRPr>
     </a:lvl9pPr>
   </p:defaultTextStyle>
+  <p:extLst>
+    <p:ext uri="{EFAFB233-063F-42B5-8137-9DF3F51BA10A}">
+      <p15:sldGuideLst xmlns:p15="http://schemas.microsoft.com/office/powerpoint/2012/main"/>
+    </p:ext>
+  </p:extLst>
 </p:presentation>
 </file>
 
@@ -264,7 +269,7 @@
           <a:p>
             <a:fld id="{AFF766EC-6D35-45F7-BE92-B419FE6B11A7}" type="datetimeFigureOut">
               <a:rPr lang="ko-KR" altLang="en-US" smtClean="0"/>
-              <a:t>2018-11-15</a:t>
+              <a:t>2018-11-18</a:t>
             </a:fld>
             <a:endParaRPr lang="ko-KR" altLang="en-US"/>
           </a:p>
@@ -462,7 +467,7 @@
           <a:p>
             <a:fld id="{AFF766EC-6D35-45F7-BE92-B419FE6B11A7}" type="datetimeFigureOut">
               <a:rPr lang="ko-KR" altLang="en-US" smtClean="0"/>
-              <a:t>2018-11-15</a:t>
+              <a:t>2018-11-18</a:t>
             </a:fld>
             <a:endParaRPr lang="ko-KR" altLang="en-US"/>
           </a:p>
@@ -670,7 +675,7 @@
           <a:p>
             <a:fld id="{AFF766EC-6D35-45F7-BE92-B419FE6B11A7}" type="datetimeFigureOut">
               <a:rPr lang="ko-KR" altLang="en-US" smtClean="0"/>
-              <a:t>2018-11-15</a:t>
+              <a:t>2018-11-18</a:t>
             </a:fld>
             <a:endParaRPr lang="ko-KR" altLang="en-US"/>
           </a:p>
@@ -869,7 +874,7 @@
           <a:p>
             <a:fld id="{AFF766EC-6D35-45F7-BE92-B419FE6B11A7}" type="datetimeFigureOut">
               <a:rPr lang="ko-KR" altLang="en-US" smtClean="0"/>
-              <a:t>2018-11-15</a:t>
+              <a:t>2018-11-18</a:t>
             </a:fld>
             <a:endParaRPr lang="ko-KR" altLang="en-US"/>
           </a:p>
@@ -1144,7 +1149,7 @@
           <a:p>
             <a:fld id="{AFF766EC-6D35-45F7-BE92-B419FE6B11A7}" type="datetimeFigureOut">
               <a:rPr lang="ko-KR" altLang="en-US" smtClean="0"/>
-              <a:t>2018-11-15</a:t>
+              <a:t>2018-11-18</a:t>
             </a:fld>
             <a:endParaRPr lang="ko-KR" altLang="en-US"/>
           </a:p>
@@ -1409,7 +1414,7 @@
           <a:p>
             <a:fld id="{AFF766EC-6D35-45F7-BE92-B419FE6B11A7}" type="datetimeFigureOut">
               <a:rPr lang="ko-KR" altLang="en-US" smtClean="0"/>
-              <a:t>2018-11-15</a:t>
+              <a:t>2018-11-18</a:t>
             </a:fld>
             <a:endParaRPr lang="ko-KR" altLang="en-US"/>
           </a:p>
@@ -1821,7 +1826,7 @@
           <a:p>
             <a:fld id="{AFF766EC-6D35-45F7-BE92-B419FE6B11A7}" type="datetimeFigureOut">
               <a:rPr lang="ko-KR" altLang="en-US" smtClean="0"/>
-              <a:t>2018-11-15</a:t>
+              <a:t>2018-11-18</a:t>
             </a:fld>
             <a:endParaRPr lang="ko-KR" altLang="en-US"/>
           </a:p>
@@ -1962,7 +1967,7 @@
           <a:p>
             <a:fld id="{AFF766EC-6D35-45F7-BE92-B419FE6B11A7}" type="datetimeFigureOut">
               <a:rPr lang="ko-KR" altLang="en-US" smtClean="0"/>
-              <a:t>2018-11-15</a:t>
+              <a:t>2018-11-18</a:t>
             </a:fld>
             <a:endParaRPr lang="ko-KR" altLang="en-US"/>
           </a:p>
@@ -2075,7 +2080,7 @@
           <a:p>
             <a:fld id="{AFF766EC-6D35-45F7-BE92-B419FE6B11A7}" type="datetimeFigureOut">
               <a:rPr lang="ko-KR" altLang="en-US" smtClean="0"/>
-              <a:t>2018-11-15</a:t>
+              <a:t>2018-11-18</a:t>
             </a:fld>
             <a:endParaRPr lang="ko-KR" altLang="en-US"/>
           </a:p>
@@ -2386,7 +2391,7 @@
           <a:p>
             <a:fld id="{AFF766EC-6D35-45F7-BE92-B419FE6B11A7}" type="datetimeFigureOut">
               <a:rPr lang="ko-KR" altLang="en-US" smtClean="0"/>
-              <a:t>2018-11-15</a:t>
+              <a:t>2018-11-18</a:t>
             </a:fld>
             <a:endParaRPr lang="ko-KR" altLang="en-US"/>
           </a:p>
@@ -2674,7 +2679,7 @@
           <a:p>
             <a:fld id="{AFF766EC-6D35-45F7-BE92-B419FE6B11A7}" type="datetimeFigureOut">
               <a:rPr lang="ko-KR" altLang="en-US" smtClean="0"/>
-              <a:t>2018-11-15</a:t>
+              <a:t>2018-11-18</a:t>
             </a:fld>
             <a:endParaRPr lang="ko-KR" altLang="en-US"/>
           </a:p>
@@ -2915,7 +2920,7 @@
           <a:p>
             <a:fld id="{AFF766EC-6D35-45F7-BE92-B419FE6B11A7}" type="datetimeFigureOut">
               <a:rPr lang="ko-KR" altLang="en-US" smtClean="0"/>
-              <a:t>2018-11-15</a:t>
+              <a:t>2018-11-18</a:t>
             </a:fld>
             <a:endParaRPr lang="ko-KR" altLang="en-US"/>
           </a:p>
@@ -3384,7 +3389,15 @@
           <a:p>
             <a:r>
               <a:rPr lang="en-US" altLang="ko-KR" dirty="0"/>
-              <a:t>Signed by Leader</a:t>
+              <a:t>Signed by </a:t>
+            </a:r>
+            <a:r>
+              <a:rPr lang="en-US" altLang="ko-KR" dirty="0" err="1"/>
+              <a:t>HyoenGyu</a:t>
+            </a:r>
+            <a:r>
+              <a:rPr lang="en-US" altLang="ko-KR" sz="1800" dirty="0"/>
+              <a:t>(Member_2)</a:t>
             </a:r>
             <a:endParaRPr lang="ko-KR" altLang="en-US" dirty="0"/>
           </a:p>

</xml_diff>